<commit_message>
Update Resumen proceso facturación.pptx
</commit_message>
<xml_diff>
--- a/Resumen proceso facturación.pptx
+++ b/Resumen proceso facturación.pptx
@@ -267,7 +267,7 @@
           <a:p>
             <a:fld id="{6AD6EE87-EBD5-4F12-A48A-63ACA297AC8F}" type="datetimeFigureOut">
               <a:rPr lang="en-US" smtClean="0"/>
-              <a:t>8/17/2020</a:t>
+              <a:t>10/25/2020</a:t>
             </a:fld>
             <a:endParaRPr lang="en-US" dirty="0"/>
           </a:p>
@@ -510,7 +510,7 @@
           <a:p>
             <a:fld id="{4CD73815-2707-4475-8F1A-B873CB631BB4}" type="datetimeFigureOut">
               <a:rPr lang="en-US" smtClean="0"/>
-              <a:t>8/17/2020</a:t>
+              <a:t>10/25/2020</a:t>
             </a:fld>
             <a:endParaRPr lang="en-US" dirty="0"/>
           </a:p>
@@ -690,7 +690,7 @@
           <a:p>
             <a:fld id="{2A4AFB99-0EAB-4182-AFF8-E214C82A68F6}" type="datetimeFigureOut">
               <a:rPr lang="en-US" smtClean="0"/>
-              <a:t>8/17/2020</a:t>
+              <a:t>10/25/2020</a:t>
             </a:fld>
             <a:endParaRPr lang="en-US" dirty="0"/>
           </a:p>
@@ -895,7 +895,7 @@
           <a:p>
             <a:fld id="{A5D3794B-289A-4A80-97D7-111025398D45}" type="datetimeFigureOut">
               <a:rPr lang="en-US" smtClean="0"/>
-              <a:t>8/17/2020</a:t>
+              <a:t>10/25/2020</a:t>
             </a:fld>
             <a:endParaRPr lang="en-US" dirty="0"/>
           </a:p>
@@ -1152,7 +1152,7 @@
           <a:p>
             <a:fld id="{5A61015F-7CC6-4D0A-9D87-873EA4C304CC}" type="datetimeFigureOut">
               <a:rPr lang="en-US" smtClean="0"/>
-              <a:t>8/17/2020</a:t>
+              <a:t>10/25/2020</a:t>
             </a:fld>
             <a:endParaRPr lang="en-US" dirty="0"/>
           </a:p>
@@ -1499,7 +1499,7 @@
           <a:p>
             <a:fld id="{93C6A301-0538-44EC-B09D-202E1042A48B}" type="datetimeFigureOut">
               <a:rPr lang="en-US" smtClean="0"/>
-              <a:t>8/17/2020</a:t>
+              <a:t>10/25/2020</a:t>
             </a:fld>
             <a:endParaRPr lang="en-US" dirty="0"/>
           </a:p>
@@ -1901,7 +1901,7 @@
           <a:p>
             <a:fld id="{D789574A-8875-45EF-8EA2-3CAA0F7ABC4C}" type="datetimeFigureOut">
               <a:rPr lang="en-US" smtClean="0"/>
-              <a:t>8/17/2020</a:t>
+              <a:t>10/25/2020</a:t>
             </a:fld>
             <a:endParaRPr lang="en-US" dirty="0"/>
           </a:p>
@@ -2019,7 +2019,7 @@
           <a:p>
             <a:fld id="{67EF4D4C-5367-4C26-9E2B-D8088D7FCA81}" type="datetimeFigureOut">
               <a:rPr lang="en-US" smtClean="0"/>
-              <a:t>8/17/2020</a:t>
+              <a:t>10/25/2020</a:t>
             </a:fld>
             <a:endParaRPr lang="en-US" dirty="0"/>
           </a:p>
@@ -2114,7 +2114,7 @@
           <a:p>
             <a:fld id="{56E91E96-98B0-4413-9547-46F3504108EF}" type="datetimeFigureOut">
               <a:rPr lang="en-US" smtClean="0"/>
-              <a:t>8/17/2020</a:t>
+              <a:t>10/25/2020</a:t>
             </a:fld>
             <a:endParaRPr lang="en-US" dirty="0"/>
           </a:p>
@@ -2404,7 +2404,7 @@
           <a:p>
             <a:fld id="{05C68B11-C5A8-448C-8CE9-B1A273C79CFC}" type="datetimeFigureOut">
               <a:rPr lang="en-US" smtClean="0"/>
-              <a:t>8/17/2020</a:t>
+              <a:t>10/25/2020</a:t>
             </a:fld>
             <a:endParaRPr lang="en-US" dirty="0"/>
           </a:p>
@@ -2684,7 +2684,7 @@
           <a:p>
             <a:fld id="{C7616CA0-919D-4A49-9C8A-62FDFB3A5183}" type="datetimeFigureOut">
               <a:rPr lang="en-US" smtClean="0"/>
-              <a:t>8/17/2020</a:t>
+              <a:t>10/25/2020</a:t>
             </a:fld>
             <a:endParaRPr lang="en-US" dirty="0"/>
           </a:p>
@@ -2935,7 +2935,7 @@
             <a:fld id="{90298CD5-6C1E-4009-B41F-6DF62E31D3BE}" type="datetimeFigureOut">
               <a:rPr lang="en-US" smtClean="0"/>
               <a:pPr/>
-              <a:t>8/17/2020</a:t>
+              <a:t>10/25/2020</a:t>
             </a:fld>
             <a:endParaRPr lang="en-US" dirty="0"/>
           </a:p>
@@ -3594,12 +3594,12 @@
         </p:nvSpPr>
         <p:spPr>
           <a:xfrm>
-            <a:off x="8451608" y="643467"/>
-            <a:ext cx="3096926" cy="5571066"/>
+            <a:off x="8451608" y="2926080"/>
+            <a:ext cx="3096926" cy="2103121"/>
           </a:xfrm>
         </p:spPr>
         <p:txBody>
-          <a:bodyPr>
+          <a:bodyPr anchor="t">
             <a:normAutofit/>
           </a:bodyPr>
           <a:lstStyle/>
@@ -3621,6 +3621,24 @@
                 </a:solidFill>
               </a:rPr>
               <a:t>FabLab UTFSM 2020</a:t>
+            </a:r>
+          </a:p>
+          <a:p>
+            <a:pPr>
+              <a:lnSpc>
+                <a:spcPct val="300000"/>
+              </a:lnSpc>
+              <a:spcBef>
+                <a:spcPts val="3600"/>
+              </a:spcBef>
+            </a:pPr>
+            <a:r>
+              <a:rPr lang="es-CL" sz="1600" cap="small" dirty="0">
+                <a:solidFill>
+                  <a:schemeClr val="tx1"/>
+                </a:solidFill>
+              </a:rPr>
+              <a:t>V1.A.O.</a:t>
             </a:r>
           </a:p>
         </p:txBody>
@@ -9799,55 +9817,6 @@
           </a:p>
         </p:txBody>
       </p:sp>
-      <p:sp>
-        <p:nvSpPr>
-          <p:cNvPr id="3" name="Subtítulo 2">
-            <a:extLst>
-              <a:ext uri="{FF2B5EF4-FFF2-40B4-BE49-F238E27FC236}">
-                <a16:creationId xmlns:a16="http://schemas.microsoft.com/office/drawing/2014/main" id="{5D7BB89B-6ADF-411A-9652-EC71CCE41BAA}"/>
-              </a:ext>
-            </a:extLst>
-          </p:cNvPr>
-          <p:cNvSpPr>
-            <a:spLocks noGrp="1"/>
-          </p:cNvSpPr>
-          <p:nvPr>
-            <p:ph type="subTitle" idx="1"/>
-          </p:nvPr>
-        </p:nvSpPr>
-        <p:spPr>
-          <a:xfrm>
-            <a:off x="8451608" y="643467"/>
-            <a:ext cx="3096926" cy="5571066"/>
-          </a:xfrm>
-        </p:spPr>
-        <p:txBody>
-          <a:bodyPr>
-            <a:normAutofit/>
-          </a:bodyPr>
-          <a:lstStyle/>
-          <a:p>
-            <a:r>
-              <a:rPr lang="es-CL" sz="2400" cap="small" dirty="0">
-                <a:solidFill>
-                  <a:schemeClr val="tx1"/>
-                </a:solidFill>
-              </a:rPr>
-              <a:t>Finanzas</a:t>
-            </a:r>
-          </a:p>
-          <a:p>
-            <a:r>
-              <a:rPr lang="es-CL" sz="2400" cap="small" dirty="0">
-                <a:solidFill>
-                  <a:schemeClr val="tx1"/>
-                </a:solidFill>
-              </a:rPr>
-              <a:t>FabLab UTFSM 2020</a:t>
-            </a:r>
-          </a:p>
-        </p:txBody>
-      </p:sp>
       <p:cxnSp>
         <p:nvCxnSpPr>
           <p:cNvPr id="11" name="Straight Connector 10">
@@ -9900,6 +9869,300 @@
           </a:fontRef>
         </p:style>
       </p:cxnSp>
+      <p:sp>
+        <p:nvSpPr>
+          <p:cNvPr id="10" name="Subtítulo 2">
+            <a:extLst>
+              <a:ext uri="{FF2B5EF4-FFF2-40B4-BE49-F238E27FC236}">
+                <a16:creationId xmlns:a16="http://schemas.microsoft.com/office/drawing/2014/main" id="{EBF8672A-EF23-4365-A543-6FF6CDEF3E68}"/>
+              </a:ext>
+            </a:extLst>
+          </p:cNvPr>
+          <p:cNvSpPr txBox="1">
+            <a:spLocks/>
+          </p:cNvSpPr>
+          <p:nvPr/>
+        </p:nvSpPr>
+        <p:spPr>
+          <a:xfrm>
+            <a:off x="8451608" y="2926080"/>
+            <a:ext cx="3096926" cy="2103121"/>
+          </a:xfrm>
+          <a:prstGeom prst="rect">
+            <a:avLst/>
+          </a:prstGeom>
+        </p:spPr>
+        <p:txBody>
+          <a:bodyPr vert="horz" lIns="91440" tIns="45720" rIns="91440" bIns="45720" rtlCol="0" anchor="t">
+            <a:normAutofit/>
+          </a:bodyPr>
+          <a:lstStyle>
+            <a:lvl1pPr marL="0" indent="0" algn="l" defTabSz="914400" rtl="0" eaLnBrk="1" latinLnBrk="0" hangingPunct="1">
+              <a:lnSpc>
+                <a:spcPct val="100000"/>
+              </a:lnSpc>
+              <a:spcBef>
+                <a:spcPts val="0"/>
+              </a:spcBef>
+              <a:spcAft>
+                <a:spcPts val="200"/>
+              </a:spcAft>
+              <a:buClr>
+                <a:schemeClr val="accent2"/>
+              </a:buClr>
+              <a:buSzPct val="100000"/>
+              <a:buFont typeface="Tw Cen MT" panose="020B0602020104020603" pitchFamily="34" charset="0"/>
+              <a:buNone/>
+              <a:defRPr sz="1800" kern="1200">
+                <a:solidFill>
+                  <a:schemeClr val="tx1">
+                    <a:lumMod val="95000"/>
+                    <a:lumOff val="5000"/>
+                  </a:schemeClr>
+                </a:solidFill>
+                <a:latin typeface="+mn-lt"/>
+                <a:ea typeface="+mn-ea"/>
+                <a:cs typeface="+mn-cs"/>
+              </a:defRPr>
+            </a:lvl1pPr>
+            <a:lvl2pPr marL="457200" indent="0" algn="ctr" defTabSz="914400" rtl="0" eaLnBrk="1" latinLnBrk="0" hangingPunct="1">
+              <a:lnSpc>
+                <a:spcPct val="90000"/>
+              </a:lnSpc>
+              <a:spcBef>
+                <a:spcPts val="200"/>
+              </a:spcBef>
+              <a:spcAft>
+                <a:spcPts val="400"/>
+              </a:spcAft>
+              <a:buClr>
+                <a:schemeClr val="accent2"/>
+              </a:buClr>
+              <a:buFont typeface="Wingdings 3" pitchFamily="18" charset="2"/>
+              <a:buNone/>
+              <a:defRPr sz="1800" kern="1200">
+                <a:solidFill>
+                  <a:schemeClr val="tx1"/>
+                </a:solidFill>
+                <a:latin typeface="+mn-lt"/>
+                <a:ea typeface="+mn-ea"/>
+                <a:cs typeface="+mn-cs"/>
+              </a:defRPr>
+            </a:lvl2pPr>
+            <a:lvl3pPr marL="914400" indent="0" algn="ctr" defTabSz="914400" rtl="0" eaLnBrk="1" latinLnBrk="0" hangingPunct="1">
+              <a:lnSpc>
+                <a:spcPct val="90000"/>
+              </a:lnSpc>
+              <a:spcBef>
+                <a:spcPts val="200"/>
+              </a:spcBef>
+              <a:spcAft>
+                <a:spcPts val="400"/>
+              </a:spcAft>
+              <a:buClr>
+                <a:schemeClr val="accent2"/>
+              </a:buClr>
+              <a:buFont typeface="Wingdings 3" pitchFamily="18" charset="2"/>
+              <a:buNone/>
+              <a:defRPr sz="1800" kern="1200">
+                <a:solidFill>
+                  <a:schemeClr val="tx1"/>
+                </a:solidFill>
+                <a:latin typeface="+mn-lt"/>
+                <a:ea typeface="+mn-ea"/>
+                <a:cs typeface="+mn-cs"/>
+              </a:defRPr>
+            </a:lvl3pPr>
+            <a:lvl4pPr marL="1371600" indent="0" algn="ctr" defTabSz="914400" rtl="0" eaLnBrk="1" latinLnBrk="0" hangingPunct="1">
+              <a:lnSpc>
+                <a:spcPct val="90000"/>
+              </a:lnSpc>
+              <a:spcBef>
+                <a:spcPts val="200"/>
+              </a:spcBef>
+              <a:spcAft>
+                <a:spcPts val="400"/>
+              </a:spcAft>
+              <a:buClr>
+                <a:schemeClr val="accent2"/>
+              </a:buClr>
+              <a:buFont typeface="Wingdings 3" pitchFamily="18" charset="2"/>
+              <a:buNone/>
+              <a:defRPr sz="1800" kern="1200">
+                <a:solidFill>
+                  <a:schemeClr val="tx1"/>
+                </a:solidFill>
+                <a:latin typeface="+mn-lt"/>
+                <a:ea typeface="+mn-ea"/>
+                <a:cs typeface="+mn-cs"/>
+              </a:defRPr>
+            </a:lvl4pPr>
+            <a:lvl5pPr marL="1828800" indent="0" algn="ctr" defTabSz="914400" rtl="0" eaLnBrk="1" latinLnBrk="0" hangingPunct="1">
+              <a:lnSpc>
+                <a:spcPct val="90000"/>
+              </a:lnSpc>
+              <a:spcBef>
+                <a:spcPts val="200"/>
+              </a:spcBef>
+              <a:spcAft>
+                <a:spcPts val="400"/>
+              </a:spcAft>
+              <a:buClr>
+                <a:schemeClr val="accent2"/>
+              </a:buClr>
+              <a:buFont typeface="Wingdings 3" pitchFamily="18" charset="2"/>
+              <a:buNone/>
+              <a:defRPr sz="1800" kern="1200">
+                <a:solidFill>
+                  <a:schemeClr val="tx1"/>
+                </a:solidFill>
+                <a:latin typeface="+mn-lt"/>
+                <a:ea typeface="+mn-ea"/>
+                <a:cs typeface="+mn-cs"/>
+              </a:defRPr>
+            </a:lvl5pPr>
+            <a:lvl6pPr marL="2286000" indent="0" algn="ctr" defTabSz="914400" rtl="0" eaLnBrk="1" latinLnBrk="0" hangingPunct="1">
+              <a:lnSpc>
+                <a:spcPct val="90000"/>
+              </a:lnSpc>
+              <a:spcBef>
+                <a:spcPts val="200"/>
+              </a:spcBef>
+              <a:spcAft>
+                <a:spcPts val="400"/>
+              </a:spcAft>
+              <a:buClr>
+                <a:schemeClr val="accent2"/>
+              </a:buClr>
+              <a:buFont typeface="Wingdings 3" pitchFamily="18" charset="2"/>
+              <a:buNone/>
+              <a:defRPr sz="1800" kern="1200">
+                <a:solidFill>
+                  <a:schemeClr val="tx1"/>
+                </a:solidFill>
+                <a:latin typeface="+mn-lt"/>
+                <a:ea typeface="+mn-ea"/>
+                <a:cs typeface="+mn-cs"/>
+              </a:defRPr>
+            </a:lvl6pPr>
+            <a:lvl7pPr marL="2743200" indent="0" algn="ctr" defTabSz="914400" rtl="0" eaLnBrk="1" latinLnBrk="0" hangingPunct="1">
+              <a:lnSpc>
+                <a:spcPct val="90000"/>
+              </a:lnSpc>
+              <a:spcBef>
+                <a:spcPts val="200"/>
+              </a:spcBef>
+              <a:spcAft>
+                <a:spcPts val="400"/>
+              </a:spcAft>
+              <a:buClr>
+                <a:schemeClr val="accent2"/>
+              </a:buClr>
+              <a:buFont typeface="Wingdings 3" pitchFamily="18" charset="2"/>
+              <a:buNone/>
+              <a:defRPr sz="1800" kern="1200">
+                <a:solidFill>
+                  <a:schemeClr val="tx1"/>
+                </a:solidFill>
+                <a:latin typeface="+mn-lt"/>
+                <a:ea typeface="+mn-ea"/>
+                <a:cs typeface="+mn-cs"/>
+              </a:defRPr>
+            </a:lvl7pPr>
+            <a:lvl8pPr marL="3200400" indent="0" algn="ctr" defTabSz="914400" rtl="0" eaLnBrk="1" latinLnBrk="0" hangingPunct="1">
+              <a:lnSpc>
+                <a:spcPct val="90000"/>
+              </a:lnSpc>
+              <a:spcBef>
+                <a:spcPts val="200"/>
+              </a:spcBef>
+              <a:spcAft>
+                <a:spcPts val="400"/>
+              </a:spcAft>
+              <a:buClr>
+                <a:schemeClr val="accent2"/>
+              </a:buClr>
+              <a:buFont typeface="Wingdings 3" pitchFamily="18" charset="2"/>
+              <a:buNone/>
+              <a:defRPr sz="1800" kern="1200">
+                <a:solidFill>
+                  <a:schemeClr val="tx1"/>
+                </a:solidFill>
+                <a:latin typeface="+mn-lt"/>
+                <a:ea typeface="+mn-ea"/>
+                <a:cs typeface="+mn-cs"/>
+              </a:defRPr>
+            </a:lvl8pPr>
+            <a:lvl9pPr marL="3657600" indent="0" algn="ctr" defTabSz="914400" rtl="0" eaLnBrk="1" latinLnBrk="0" hangingPunct="1">
+              <a:lnSpc>
+                <a:spcPct val="90000"/>
+              </a:lnSpc>
+              <a:spcBef>
+                <a:spcPts val="200"/>
+              </a:spcBef>
+              <a:spcAft>
+                <a:spcPts val="400"/>
+              </a:spcAft>
+              <a:buClr>
+                <a:schemeClr val="accent2"/>
+              </a:buClr>
+              <a:buFont typeface="Wingdings 3" pitchFamily="18" charset="2"/>
+              <a:buNone/>
+              <a:defRPr sz="1800" kern="1200">
+                <a:solidFill>
+                  <a:schemeClr val="tx1"/>
+                </a:solidFill>
+                <a:latin typeface="+mn-lt"/>
+                <a:ea typeface="+mn-ea"/>
+                <a:cs typeface="+mn-cs"/>
+              </a:defRPr>
+            </a:lvl9pPr>
+          </a:lstStyle>
+          <a:p>
+            <a:r>
+              <a:rPr lang="es-CL" sz="2400" cap="small">
+                <a:solidFill>
+                  <a:schemeClr val="tx1"/>
+                </a:solidFill>
+              </a:rPr>
+              <a:t>Finanzas</a:t>
+            </a:r>
+          </a:p>
+          <a:p>
+            <a:r>
+              <a:rPr lang="es-CL" sz="2400" cap="small">
+                <a:solidFill>
+                  <a:schemeClr val="tx1"/>
+                </a:solidFill>
+              </a:rPr>
+              <a:t>FabLab UTFSM 2020</a:t>
+            </a:r>
+          </a:p>
+          <a:p>
+            <a:pPr>
+              <a:lnSpc>
+                <a:spcPct val="300000"/>
+              </a:lnSpc>
+              <a:spcBef>
+                <a:spcPts val="3600"/>
+              </a:spcBef>
+            </a:pPr>
+            <a:r>
+              <a:rPr lang="es-CL" sz="1600" cap="small">
+                <a:solidFill>
+                  <a:schemeClr val="tx1"/>
+                </a:solidFill>
+              </a:rPr>
+              <a:t>V1.A.O.</a:t>
+            </a:r>
+            <a:endParaRPr lang="es-CL" sz="1600" cap="small" dirty="0">
+              <a:solidFill>
+                <a:schemeClr val="tx1"/>
+              </a:solidFill>
+            </a:endParaRPr>
+          </a:p>
+        </p:txBody>
+      </p:sp>
     </p:spTree>
     <p:extLst>
       <p:ext uri="{BB962C8B-B14F-4D97-AF65-F5344CB8AC3E}">

</xml_diff>